<commit_message>
missed this on last commit
</commit_message>
<xml_diff>
--- a/spark_pres_slides.pptx
+++ b/spark_pres_slides.pptx
@@ -5985,7 +5985,23 @@
             </a:r>
             <a:r>
               <a:rPr lang="en-US" sz="2400" dirty="0"/>
-              <a:t>, </a:t>
+              <a:t> (</a:t>
+            </a:r>
+            <a:r>
+              <a:rPr lang="en-US" sz="2400" dirty="0" err="1"/>
+              <a:t>Redis</a:t>
+            </a:r>
+            <a:r>
+              <a:rPr lang="en-US" sz="2400" dirty="0"/>
+              <a:t>, Cassandra, </a:t>
+            </a:r>
+            <a:r>
+              <a:rPr lang="en-US" sz="2400" dirty="0" err="1"/>
+              <a:t>DynamoDB</a:t>
+            </a:r>
+            <a:r>
+              <a:rPr lang="en-US" sz="2400" dirty="0"/>
+              <a:t>), </a:t>
             </a:r>
             <a:r>
               <a:rPr lang="en-US" sz="2400" dirty="0" err="1"/>
@@ -5996,13 +6012,8 @@
           <a:p>
             <a:r>
               <a:rPr lang="en-US" sz="2400" dirty="0"/>
-              <a:t>Written in </a:t>
-            </a:r>
-            <a:r>
-              <a:rPr lang="en-US" sz="2400" dirty="0" err="1"/>
-              <a:t>scala</a:t>
-            </a:r>
-            <a:endParaRPr lang="en-US" sz="2400" dirty="0"/>
+              <a:t>Written in Scala</a:t>
+            </a:r>
           </a:p>
           <a:p>
             <a:r>
@@ -6086,66 +6097,77 @@
             <p:ph idx="1"/>
           </p:nvPr>
         </p:nvSpPr>
-        <p:spPr/>
+        <p:spPr>
+          <a:xfrm>
+            <a:off x="677333" y="1930399"/>
+            <a:ext cx="9665880" cy="4365469"/>
+          </a:xfrm>
+        </p:spPr>
         <p:txBody>
           <a:bodyPr>
-            <a:normAutofit/>
+            <a:noAutofit/>
           </a:bodyPr>
           <a:lstStyle/>
           <a:p>
             <a:r>
-              <a:rPr lang="en-US" sz="2400" dirty="0"/>
+              <a:rPr lang="en-US" sz="2800" dirty="0"/>
+              <a:t>Horizontal Scalability on commodity hardware</a:t>
+            </a:r>
+          </a:p>
+          <a:p>
+            <a:r>
+              <a:rPr lang="en-US" sz="2800" dirty="0"/>
               <a:t>Strong streaming capabilities</a:t>
             </a:r>
           </a:p>
           <a:p>
             <a:pPr lvl="1"/>
             <a:r>
-              <a:rPr lang="en-US" sz="2400" dirty="0"/>
+              <a:rPr lang="en-US" sz="2800" dirty="0"/>
               <a:t>Integration with logs/queues</a:t>
             </a:r>
           </a:p>
           <a:p>
             <a:r>
-              <a:rPr lang="en-US" sz="2400" dirty="0"/>
+              <a:rPr lang="en-US" sz="2800" dirty="0"/>
               <a:t>Streaming analytics</a:t>
             </a:r>
           </a:p>
           <a:p>
             <a:r>
-              <a:rPr lang="en-US" sz="2400" dirty="0"/>
+              <a:rPr lang="en-US" sz="2800" dirty="0"/>
               <a:t>Data Mining and Machine Learning at scale</a:t>
             </a:r>
           </a:p>
           <a:p>
             <a:r>
-              <a:rPr lang="en-US" sz="2400" dirty="0"/>
+              <a:rPr lang="en-US" sz="2800" dirty="0"/>
               <a:t>Embedded Graph Database – </a:t>
             </a:r>
             <a:r>
-              <a:rPr lang="en-US" sz="2400" dirty="0" err="1"/>
+              <a:rPr lang="en-US" sz="2800" dirty="0" err="1"/>
               <a:t>GraphX</a:t>
             </a:r>
-            <a:endParaRPr lang="en-US" sz="2400" dirty="0"/>
-          </a:p>
-          <a:p>
-            <a:r>
-              <a:rPr lang="en-US" sz="2400" dirty="0"/>
+            <a:endParaRPr lang="en-US" sz="2800" dirty="0"/>
+          </a:p>
+          <a:p>
+            <a:r>
+              <a:rPr lang="en-US" sz="2800" dirty="0"/>
               <a:t>More intuitive to develop with</a:t>
             </a:r>
           </a:p>
           <a:p>
             <a:pPr lvl="1"/>
             <a:r>
-              <a:rPr lang="en-US" sz="2400" dirty="0"/>
+              <a:rPr lang="en-US" sz="2800" dirty="0"/>
               <a:t>Compared to MR and its wrappers (pig, hive, </a:t>
             </a:r>
             <a:r>
-              <a:rPr lang="en-US" sz="2400" dirty="0" err="1"/>
+              <a:rPr lang="en-US" sz="2800" dirty="0" err="1"/>
               <a:t>etc</a:t>
             </a:r>
             <a:r>
-              <a:rPr lang="en-US" sz="2400" dirty="0"/>
+              <a:rPr lang="en-US" sz="2800" dirty="0"/>
               <a:t>)</a:t>
             </a:r>
           </a:p>

</xml_diff>

<commit_message>
comment cleanup moved top comments to markdown for each panel couple more bullets for powerpoint
</commit_message>
<xml_diff>
--- a/spark_pres_slides.pptx
+++ b/spark_pres_slides.pptx
@@ -8,7 +8,8 @@
     <p:sldId id="256" r:id="rId2"/>
     <p:sldId id="257" r:id="rId3"/>
     <p:sldId id="258" r:id="rId4"/>
-    <p:sldId id="259" r:id="rId5"/>
+    <p:sldId id="260" r:id="rId5"/>
+    <p:sldId id="259" r:id="rId6"/>
   </p:sldIdLst>
   <p:sldSz cx="12192000" cy="6858000"/>
   <p:notesSz cx="6858000" cy="9144000"/>
@@ -838,7 +839,7 @@
             <a:fld id="{B61BEF0D-F0BB-DE4B-95CE-6DB70DBA9567}" type="datetimeFigureOut">
               <a:rPr lang="en-US" dirty="0"/>
               <a:pPr/>
-              <a:t>2/22/18</a:t>
+              <a:t>2/26/18</a:t>
             </a:fld>
             <a:endParaRPr lang="en-US" dirty="0"/>
           </a:p>
@@ -1086,7 +1087,7 @@
             <a:fld id="{B61BEF0D-F0BB-DE4B-95CE-6DB70DBA9567}" type="datetimeFigureOut">
               <a:rPr lang="en-US" dirty="0"/>
               <a:pPr/>
-              <a:t>2/22/18</a:t>
+              <a:t>2/26/18</a:t>
             </a:fld>
             <a:endParaRPr lang="en-US" dirty="0"/>
           </a:p>
@@ -1397,7 +1398,7 @@
             <a:fld id="{B61BEF0D-F0BB-DE4B-95CE-6DB70DBA9567}" type="datetimeFigureOut">
               <a:rPr lang="en-US" dirty="0"/>
               <a:pPr/>
-              <a:t>2/22/18</a:t>
+              <a:t>2/26/18</a:t>
             </a:fld>
             <a:endParaRPr lang="en-US" dirty="0"/>
           </a:p>
@@ -1735,7 +1736,7 @@
             <a:fld id="{B61BEF0D-F0BB-DE4B-95CE-6DB70DBA9567}" type="datetimeFigureOut">
               <a:rPr lang="en-US" dirty="0"/>
               <a:pPr/>
-              <a:t>2/22/18</a:t>
+              <a:t>2/26/18</a:t>
             </a:fld>
             <a:endParaRPr lang="en-US" dirty="0"/>
           </a:p>
@@ -2046,7 +2047,7 @@
             <a:fld id="{B61BEF0D-F0BB-DE4B-95CE-6DB70DBA9567}" type="datetimeFigureOut">
               <a:rPr lang="en-US" dirty="0"/>
               <a:pPr/>
-              <a:t>2/22/18</a:t>
+              <a:t>2/26/18</a:t>
             </a:fld>
             <a:endParaRPr lang="en-US" dirty="0"/>
           </a:p>
@@ -2436,7 +2437,7 @@
             <a:fld id="{B61BEF0D-F0BB-DE4B-95CE-6DB70DBA9567}" type="datetimeFigureOut">
               <a:rPr lang="en-US" dirty="0"/>
               <a:pPr/>
-              <a:t>2/22/18</a:t>
+              <a:t>2/26/18</a:t>
             </a:fld>
             <a:endParaRPr lang="en-US" dirty="0"/>
           </a:p>
@@ -2602,7 +2603,7 @@
           <a:p>
             <a:fld id="{55C6B4A9-1611-4792-9094-5F34BCA07E0B}" type="datetimeFigureOut">
               <a:rPr lang="en-US" dirty="0"/>
-              <a:t>2/22/18</a:t>
+              <a:t>2/26/18</a:t>
             </a:fld>
             <a:endParaRPr lang="en-US" dirty="0"/>
           </a:p>
@@ -2778,7 +2779,7 @@
             <a:fld id="{B61BEF0D-F0BB-DE4B-95CE-6DB70DBA9567}" type="datetimeFigureOut">
               <a:rPr lang="en-US" dirty="0"/>
               <a:pPr/>
-              <a:t>2/22/18</a:t>
+              <a:t>2/26/18</a:t>
             </a:fld>
             <a:endParaRPr lang="en-US" dirty="0"/>
           </a:p>
@@ -2951,7 +2952,7 @@
             <a:fld id="{B61BEF0D-F0BB-DE4B-95CE-6DB70DBA9567}" type="datetimeFigureOut">
               <a:rPr lang="en-US" dirty="0"/>
               <a:pPr/>
-              <a:t>2/22/18</a:t>
+              <a:t>2/26/18</a:t>
             </a:fld>
             <a:endParaRPr lang="en-US" dirty="0"/>
           </a:p>
@@ -3195,7 +3196,7 @@
             <a:fld id="{B61BEF0D-F0BB-DE4B-95CE-6DB70DBA9567}" type="datetimeFigureOut">
               <a:rPr lang="en-US" dirty="0"/>
               <a:pPr/>
-              <a:t>2/22/18</a:t>
+              <a:t>2/26/18</a:t>
             </a:fld>
             <a:endParaRPr lang="en-US" dirty="0"/>
           </a:p>
@@ -3423,7 +3424,7 @@
           <a:p>
             <a:fld id="{EB712588-04B1-427B-82EE-E8DB90309F08}" type="datetimeFigureOut">
               <a:rPr lang="en-US" dirty="0"/>
-              <a:t>2/22/18</a:t>
+              <a:t>2/26/18</a:t>
             </a:fld>
             <a:endParaRPr lang="en-US" dirty="0"/>
           </a:p>
@@ -3793,7 +3794,7 @@
             <a:fld id="{B61BEF0D-F0BB-DE4B-95CE-6DB70DBA9567}" type="datetimeFigureOut">
               <a:rPr lang="en-US" dirty="0"/>
               <a:pPr/>
-              <a:t>2/22/18</a:t>
+              <a:t>2/26/18</a:t>
             </a:fld>
             <a:endParaRPr lang="en-US" dirty="0"/>
           </a:p>
@@ -3913,7 +3914,7 @@
             <a:fld id="{B61BEF0D-F0BB-DE4B-95CE-6DB70DBA9567}" type="datetimeFigureOut">
               <a:rPr lang="en-US" dirty="0"/>
               <a:pPr/>
-              <a:t>2/22/18</a:t>
+              <a:t>2/26/18</a:t>
             </a:fld>
             <a:endParaRPr lang="en-US" dirty="0"/>
           </a:p>
@@ -4005,7 +4006,7 @@
             <a:fld id="{B61BEF0D-F0BB-DE4B-95CE-6DB70DBA9567}" type="datetimeFigureOut">
               <a:rPr lang="en-US" dirty="0"/>
               <a:pPr/>
-              <a:t>2/22/18</a:t>
+              <a:t>2/26/18</a:t>
             </a:fld>
             <a:endParaRPr lang="en-US" dirty="0"/>
           </a:p>
@@ -4256,7 +4257,7 @@
           <a:p>
             <a:fld id="{42A54C80-263E-416B-A8E0-580EDEADCBDC}" type="datetimeFigureOut">
               <a:rPr lang="en-US" dirty="0"/>
-              <a:t>2/22/18</a:t>
+              <a:t>2/26/18</a:t>
             </a:fld>
             <a:endParaRPr lang="en-US" dirty="0"/>
           </a:p>
@@ -4515,7 +4516,7 @@
             <a:fld id="{B61BEF0D-F0BB-DE4B-95CE-6DB70DBA9567}" type="datetimeFigureOut">
               <a:rPr lang="en-US" dirty="0"/>
               <a:pPr/>
-              <a:t>2/22/18</a:t>
+              <a:t>2/26/18</a:t>
             </a:fld>
             <a:endParaRPr lang="en-US" dirty="0"/>
           </a:p>
@@ -5255,7 +5256,7 @@
             <a:fld id="{B61BEF0D-F0BB-DE4B-95CE-6DB70DBA9567}" type="datetimeFigureOut">
               <a:rPr lang="en-US" dirty="0"/>
               <a:pPr/>
-              <a:t>2/22/18</a:t>
+              <a:t>2/26/18</a:t>
             </a:fld>
             <a:endParaRPr lang="en-US" dirty="0"/>
           </a:p>
@@ -5928,8 +5929,8 @@
         </p:nvSpPr>
         <p:spPr>
           <a:xfrm>
-            <a:off x="677334" y="2015623"/>
-            <a:ext cx="8596668" cy="4385177"/>
+            <a:off x="677334" y="1714499"/>
+            <a:ext cx="8596668" cy="4773983"/>
           </a:xfrm>
         </p:spPr>
         <p:txBody>
@@ -6001,24 +6002,7 @@
             </a:r>
             <a:r>
               <a:rPr lang="en-US" sz="2400" dirty="0"/>
-              <a:t>), </a:t>
-            </a:r>
-            <a:r>
-              <a:rPr lang="en-US" sz="2400" dirty="0" err="1"/>
-              <a:t>etc</a:t>
-            </a:r>
-            <a:endParaRPr lang="en-US" sz="2400" dirty="0"/>
-          </a:p>
-          <a:p>
-            <a:r>
-              <a:rPr lang="en-US" sz="2400" dirty="0"/>
-              <a:t>Written in Scala</a:t>
-            </a:r>
-          </a:p>
-          <a:p>
-            <a:r>
-              <a:rPr lang="en-US" sz="2400" dirty="0"/>
-              <a:t>Can be developed in Scala, Java, Python or R</a:t>
+              <a:t>), etc.</a:t>
             </a:r>
           </a:p>
         </p:txBody>
@@ -6069,7 +6053,12 @@
             <p:ph type="title"/>
           </p:nvPr>
         </p:nvSpPr>
-        <p:spPr/>
+        <p:spPr>
+          <a:xfrm>
+            <a:off x="677334" y="457472"/>
+            <a:ext cx="8596668" cy="1056362"/>
+          </a:xfrm>
+        </p:spPr>
         <p:txBody>
           <a:bodyPr/>
           <a:lstStyle/>
@@ -6099,8 +6088,8 @@
         </p:nvSpPr>
         <p:spPr>
           <a:xfrm>
-            <a:off x="677333" y="1930399"/>
-            <a:ext cx="9665880" cy="4365469"/>
+            <a:off x="677334" y="1644462"/>
+            <a:ext cx="10137673" cy="4750131"/>
           </a:xfrm>
         </p:spPr>
         <p:txBody>
@@ -6111,7 +6100,7 @@
           <a:p>
             <a:r>
               <a:rPr lang="en-US" sz="2800" dirty="0"/>
-              <a:t>Horizontal Scalability on commodity hardware</a:t>
+              <a:t>Horizontal scalability on commodity hardware</a:t>
             </a:r>
           </a:p>
           <a:p>
@@ -6130,6 +6119,12 @@
           <a:p>
             <a:r>
               <a:rPr lang="en-US" sz="2800" dirty="0"/>
+              <a:t>ETL</a:t>
+            </a:r>
+          </a:p>
+          <a:p>
+            <a:r>
+              <a:rPr lang="en-US" sz="2800" dirty="0"/>
               <a:t>Streaming analytics</a:t>
             </a:r>
           </a:p>
@@ -6151,25 +6146,10 @@
             <a:endParaRPr lang="en-US" sz="2800" dirty="0"/>
           </a:p>
           <a:p>
-            <a:r>
-              <a:rPr lang="en-US" sz="2800" dirty="0"/>
-              <a:t>More intuitive to develop with</a:t>
-            </a:r>
-          </a:p>
-          <a:p>
-            <a:pPr lvl="1"/>
-            <a:r>
-              <a:rPr lang="en-US" sz="2800" dirty="0"/>
-              <a:t>Compared to MR and its wrappers (pig, hive, </a:t>
-            </a:r>
-            <a:r>
-              <a:rPr lang="en-US" sz="2800" dirty="0" err="1"/>
-              <a:t>etc</a:t>
-            </a:r>
-            <a:r>
-              <a:rPr lang="en-US" sz="2800" dirty="0"/>
-              <a:t>)</a:t>
-            </a:r>
+            <a:pPr marL="457200" lvl="1" indent="0">
+              <a:buNone/>
+            </a:pPr>
+            <a:endParaRPr lang="en-US" sz="2800" dirty="0"/>
           </a:p>
         </p:txBody>
       </p:sp>
@@ -6208,6 +6188,166 @@
           <p:cNvPr id="2" name="Title 1">
             <a:extLst>
               <a:ext uri="{FF2B5EF4-FFF2-40B4-BE49-F238E27FC236}">
+                <a16:creationId xmlns:a16="http://schemas.microsoft.com/office/drawing/2014/main" id="{5946FC70-80A2-D64A-A5D9-63AC5BE7BE29}"/>
+              </a:ext>
+            </a:extLst>
+          </p:cNvPr>
+          <p:cNvSpPr>
+            <a:spLocks noGrp="1"/>
+          </p:cNvSpPr>
+          <p:nvPr>
+            <p:ph type="title"/>
+          </p:nvPr>
+        </p:nvSpPr>
+        <p:spPr/>
+        <p:txBody>
+          <a:bodyPr/>
+          <a:lstStyle/>
+          <a:p>
+            <a:r>
+              <a:rPr lang="en-US" dirty="0"/>
+              <a:t>Why…</a:t>
+            </a:r>
+          </a:p>
+        </p:txBody>
+      </p:sp>
+      <p:sp>
+        <p:nvSpPr>
+          <p:cNvPr id="3" name="Content Placeholder 2">
+            <a:extLst>
+              <a:ext uri="{FF2B5EF4-FFF2-40B4-BE49-F238E27FC236}">
+                <a16:creationId xmlns:a16="http://schemas.microsoft.com/office/drawing/2014/main" id="{0D83B219-3B15-4E47-8F50-33220B0C4A9C}"/>
+              </a:ext>
+            </a:extLst>
+          </p:cNvPr>
+          <p:cNvSpPr>
+            <a:spLocks noGrp="1"/>
+          </p:cNvSpPr>
+          <p:nvPr>
+            <p:ph idx="1"/>
+          </p:nvPr>
+        </p:nvSpPr>
+        <p:spPr>
+          <a:xfrm>
+            <a:off x="677333" y="1698171"/>
+            <a:ext cx="9392941" cy="4690754"/>
+          </a:xfrm>
+        </p:spPr>
+        <p:txBody>
+          <a:bodyPr/>
+          <a:lstStyle/>
+          <a:p>
+            <a:r>
+              <a:rPr lang="en-US" sz="2800" dirty="0"/>
+              <a:t>Development support</a:t>
+            </a:r>
+          </a:p>
+          <a:p>
+            <a:pPr lvl="1"/>
+            <a:r>
+              <a:rPr lang="en-US" sz="2800" dirty="0"/>
+              <a:t>Compared to MR and its wrappers (pig, hive, </a:t>
+            </a:r>
+            <a:r>
+              <a:rPr lang="en-US" sz="2800" dirty="0" err="1"/>
+              <a:t>etc</a:t>
+            </a:r>
+            <a:r>
+              <a:rPr lang="en-US" sz="2800" dirty="0"/>
+              <a:t>)</a:t>
+            </a:r>
+          </a:p>
+          <a:p>
+            <a:pPr lvl="1"/>
+            <a:r>
+              <a:rPr lang="en-US" sz="2800" dirty="0"/>
+              <a:t>RDD, </a:t>
+            </a:r>
+            <a:r>
+              <a:rPr lang="en-US" sz="2800" dirty="0" err="1"/>
+              <a:t>Dataframes</a:t>
+            </a:r>
+            <a:r>
+              <a:rPr lang="en-US" sz="2800" dirty="0"/>
+              <a:t>, Dataset data structures</a:t>
+            </a:r>
+          </a:p>
+          <a:p>
+            <a:pPr lvl="1"/>
+            <a:r>
+              <a:rPr lang="en-US" sz="2800" dirty="0"/>
+              <a:t>Notebook/REPL support (Zeppelin, </a:t>
+            </a:r>
+            <a:r>
+              <a:rPr lang="en-US" sz="2800" dirty="0" err="1"/>
+              <a:t>Jupyter</a:t>
+            </a:r>
+            <a:r>
+              <a:rPr lang="en-US" sz="2800" dirty="0"/>
+              <a:t>, </a:t>
+            </a:r>
+            <a:r>
+              <a:rPr lang="en-US" sz="2800" dirty="0" err="1"/>
+              <a:t>Databricks</a:t>
+            </a:r>
+            <a:r>
+              <a:rPr lang="en-US" sz="2800" dirty="0"/>
+              <a:t>…)</a:t>
+            </a:r>
+          </a:p>
+          <a:p>
+            <a:r>
+              <a:rPr lang="en-US" sz="2800" dirty="0"/>
+              <a:t>Written in Scala</a:t>
+            </a:r>
+          </a:p>
+          <a:p>
+            <a:pPr lvl="1"/>
+            <a:r>
+              <a:rPr lang="en-US" sz="2800" dirty="0"/>
+              <a:t>Can be developed in Scala, Java, Python or R</a:t>
+            </a:r>
+          </a:p>
+          <a:p>
+            <a:endParaRPr lang="en-US" dirty="0"/>
+          </a:p>
+        </p:txBody>
+      </p:sp>
+    </p:spTree>
+    <p:extLst>
+      <p:ext uri="{BB962C8B-B14F-4D97-AF65-F5344CB8AC3E}">
+        <p14:creationId xmlns:p14="http://schemas.microsoft.com/office/powerpoint/2010/main" val="1340100181"/>
+      </p:ext>
+    </p:extLst>
+  </p:cSld>
+  <p:clrMapOvr>
+    <a:masterClrMapping/>
+  </p:clrMapOvr>
+</p:sld>
+</file>
+
+<file path=ppt/slides/slide5.xml><?xml version="1.0" encoding="utf-8"?>
+<p:sld xmlns:a="http://schemas.openxmlformats.org/drawingml/2006/main" xmlns:r="http://schemas.openxmlformats.org/officeDocument/2006/relationships" xmlns:p="http://schemas.openxmlformats.org/presentationml/2006/main">
+  <p:cSld>
+    <p:spTree>
+      <p:nvGrpSpPr>
+        <p:cNvPr id="1" name=""/>
+        <p:cNvGrpSpPr/>
+        <p:nvPr/>
+      </p:nvGrpSpPr>
+      <p:grpSpPr>
+        <a:xfrm>
+          <a:off x="0" y="0"/>
+          <a:ext cx="0" cy="0"/>
+          <a:chOff x="0" y="0"/>
+          <a:chExt cx="0" cy="0"/>
+        </a:xfrm>
+      </p:grpSpPr>
+      <p:sp>
+        <p:nvSpPr>
+          <p:cNvPr id="2" name="Title 1">
+            <a:extLst>
+              <a:ext uri="{FF2B5EF4-FFF2-40B4-BE49-F238E27FC236}">
                 <a16:creationId xmlns:a16="http://schemas.microsoft.com/office/drawing/2014/main" id="{D928744B-A023-8E41-A738-58E6BA873E78}"/>
               </a:ext>
             </a:extLst>
@@ -6222,7 +6362,7 @@
         <p:spPr>
           <a:xfrm>
             <a:off x="677334" y="531541"/>
-            <a:ext cx="8596668" cy="1096537"/>
+            <a:ext cx="8596668" cy="782445"/>
           </a:xfrm>
         </p:spPr>
         <p:txBody>

</xml_diff>

<commit_message>
small tweaks, rearranging a bit
</commit_message>
<xml_diff>
--- a/spark_pres_slides.pptx
+++ b/spark_pres_slides.pptx
@@ -839,7 +839,7 @@
             <a:fld id="{B61BEF0D-F0BB-DE4B-95CE-6DB70DBA9567}" type="datetimeFigureOut">
               <a:rPr lang="en-US" dirty="0"/>
               <a:pPr/>
-              <a:t>2/26/18</a:t>
+              <a:t>2/28/18</a:t>
             </a:fld>
             <a:endParaRPr lang="en-US" dirty="0"/>
           </a:p>
@@ -1087,7 +1087,7 @@
             <a:fld id="{B61BEF0D-F0BB-DE4B-95CE-6DB70DBA9567}" type="datetimeFigureOut">
               <a:rPr lang="en-US" dirty="0"/>
               <a:pPr/>
-              <a:t>2/26/18</a:t>
+              <a:t>2/28/18</a:t>
             </a:fld>
             <a:endParaRPr lang="en-US" dirty="0"/>
           </a:p>
@@ -1398,7 +1398,7 @@
             <a:fld id="{B61BEF0D-F0BB-DE4B-95CE-6DB70DBA9567}" type="datetimeFigureOut">
               <a:rPr lang="en-US" dirty="0"/>
               <a:pPr/>
-              <a:t>2/26/18</a:t>
+              <a:t>2/28/18</a:t>
             </a:fld>
             <a:endParaRPr lang="en-US" dirty="0"/>
           </a:p>
@@ -1736,7 +1736,7 @@
             <a:fld id="{B61BEF0D-F0BB-DE4B-95CE-6DB70DBA9567}" type="datetimeFigureOut">
               <a:rPr lang="en-US" dirty="0"/>
               <a:pPr/>
-              <a:t>2/26/18</a:t>
+              <a:t>2/28/18</a:t>
             </a:fld>
             <a:endParaRPr lang="en-US" dirty="0"/>
           </a:p>
@@ -2047,7 +2047,7 @@
             <a:fld id="{B61BEF0D-F0BB-DE4B-95CE-6DB70DBA9567}" type="datetimeFigureOut">
               <a:rPr lang="en-US" dirty="0"/>
               <a:pPr/>
-              <a:t>2/26/18</a:t>
+              <a:t>2/28/18</a:t>
             </a:fld>
             <a:endParaRPr lang="en-US" dirty="0"/>
           </a:p>
@@ -2437,7 +2437,7 @@
             <a:fld id="{B61BEF0D-F0BB-DE4B-95CE-6DB70DBA9567}" type="datetimeFigureOut">
               <a:rPr lang="en-US" dirty="0"/>
               <a:pPr/>
-              <a:t>2/26/18</a:t>
+              <a:t>2/28/18</a:t>
             </a:fld>
             <a:endParaRPr lang="en-US" dirty="0"/>
           </a:p>
@@ -2603,7 +2603,7 @@
           <a:p>
             <a:fld id="{55C6B4A9-1611-4792-9094-5F34BCA07E0B}" type="datetimeFigureOut">
               <a:rPr lang="en-US" dirty="0"/>
-              <a:t>2/26/18</a:t>
+              <a:t>2/28/18</a:t>
             </a:fld>
             <a:endParaRPr lang="en-US" dirty="0"/>
           </a:p>
@@ -2779,7 +2779,7 @@
             <a:fld id="{B61BEF0D-F0BB-DE4B-95CE-6DB70DBA9567}" type="datetimeFigureOut">
               <a:rPr lang="en-US" dirty="0"/>
               <a:pPr/>
-              <a:t>2/26/18</a:t>
+              <a:t>2/28/18</a:t>
             </a:fld>
             <a:endParaRPr lang="en-US" dirty="0"/>
           </a:p>
@@ -2952,7 +2952,7 @@
             <a:fld id="{B61BEF0D-F0BB-DE4B-95CE-6DB70DBA9567}" type="datetimeFigureOut">
               <a:rPr lang="en-US" dirty="0"/>
               <a:pPr/>
-              <a:t>2/26/18</a:t>
+              <a:t>2/28/18</a:t>
             </a:fld>
             <a:endParaRPr lang="en-US" dirty="0"/>
           </a:p>
@@ -3196,7 +3196,7 @@
             <a:fld id="{B61BEF0D-F0BB-DE4B-95CE-6DB70DBA9567}" type="datetimeFigureOut">
               <a:rPr lang="en-US" dirty="0"/>
               <a:pPr/>
-              <a:t>2/26/18</a:t>
+              <a:t>2/28/18</a:t>
             </a:fld>
             <a:endParaRPr lang="en-US" dirty="0"/>
           </a:p>
@@ -3424,7 +3424,7 @@
           <a:p>
             <a:fld id="{EB712588-04B1-427B-82EE-E8DB90309F08}" type="datetimeFigureOut">
               <a:rPr lang="en-US" dirty="0"/>
-              <a:t>2/26/18</a:t>
+              <a:t>2/28/18</a:t>
             </a:fld>
             <a:endParaRPr lang="en-US" dirty="0"/>
           </a:p>
@@ -3794,7 +3794,7 @@
             <a:fld id="{B61BEF0D-F0BB-DE4B-95CE-6DB70DBA9567}" type="datetimeFigureOut">
               <a:rPr lang="en-US" dirty="0"/>
               <a:pPr/>
-              <a:t>2/26/18</a:t>
+              <a:t>2/28/18</a:t>
             </a:fld>
             <a:endParaRPr lang="en-US" dirty="0"/>
           </a:p>
@@ -3914,7 +3914,7 @@
             <a:fld id="{B61BEF0D-F0BB-DE4B-95CE-6DB70DBA9567}" type="datetimeFigureOut">
               <a:rPr lang="en-US" dirty="0"/>
               <a:pPr/>
-              <a:t>2/26/18</a:t>
+              <a:t>2/28/18</a:t>
             </a:fld>
             <a:endParaRPr lang="en-US" dirty="0"/>
           </a:p>
@@ -4006,7 +4006,7 @@
             <a:fld id="{B61BEF0D-F0BB-DE4B-95CE-6DB70DBA9567}" type="datetimeFigureOut">
               <a:rPr lang="en-US" dirty="0"/>
               <a:pPr/>
-              <a:t>2/26/18</a:t>
+              <a:t>2/28/18</a:t>
             </a:fld>
             <a:endParaRPr lang="en-US" dirty="0"/>
           </a:p>
@@ -4257,7 +4257,7 @@
           <a:p>
             <a:fld id="{42A54C80-263E-416B-A8E0-580EDEADCBDC}" type="datetimeFigureOut">
               <a:rPr lang="en-US" dirty="0"/>
-              <a:t>2/26/18</a:t>
+              <a:t>2/28/18</a:t>
             </a:fld>
             <a:endParaRPr lang="en-US" dirty="0"/>
           </a:p>
@@ -4516,7 +4516,7 @@
             <a:fld id="{B61BEF0D-F0BB-DE4B-95CE-6DB70DBA9567}" type="datetimeFigureOut">
               <a:rPr lang="en-US" dirty="0"/>
               <a:pPr/>
-              <a:t>2/26/18</a:t>
+              <a:t>2/28/18</a:t>
             </a:fld>
             <a:endParaRPr lang="en-US" dirty="0"/>
           </a:p>
@@ -5256,7 +5256,7 @@
             <a:fld id="{B61BEF0D-F0BB-DE4B-95CE-6DB70DBA9567}" type="datetimeFigureOut">
               <a:rPr lang="en-US" dirty="0"/>
               <a:pPr/>
-              <a:t>2/26/18</a:t>
+              <a:t>2/28/18</a:t>
             </a:fld>
             <a:endParaRPr lang="en-US" dirty="0"/>
           </a:p>
@@ -6119,13 +6119,13 @@
           <a:p>
             <a:r>
               <a:rPr lang="en-US" sz="2800" dirty="0"/>
+              <a:t>Streaming analytics</a:t>
+            </a:r>
+          </a:p>
+          <a:p>
+            <a:r>
+              <a:rPr lang="en-US" sz="2800" dirty="0"/>
               <a:t>ETL</a:t>
-            </a:r>
-          </a:p>
-          <a:p>
-            <a:r>
-              <a:rPr lang="en-US" sz="2800" dirty="0"/>
-              <a:t>Streaming analytics</a:t>
             </a:r>
           </a:p>
           <a:p>
@@ -6163,6 +6163,14 @@
   <p:clrMapOvr>
     <a:masterClrMapping/>
   </p:clrMapOvr>
+  <mc:AlternateContent xmlns:mc="http://schemas.openxmlformats.org/markup-compatibility/2006">
+    <mc:Choice xmlns:p14="http://schemas.microsoft.com/office/powerpoint/2010/main" Requires="p14">
+      <p:transition p14:dur="10"/>
+    </mc:Choice>
+    <mc:Fallback>
+      <p:transition/>
+    </mc:Fallback>
+  </mc:AlternateContent>
 </p:sld>
 </file>
 

</xml_diff>